<commit_message>
add content to age-and-growth notebook, and update PowerPoint
</commit_message>
<xml_diff>
--- a/TESA_Simulation_Workshop_2021_Breakout_Report_Make_a_World.pptx
+++ b/TESA_Simulation_Workshop_2021_Breakout_Report_Make_a_World.pptx
@@ -6233,12 +6233,176 @@
             <p:ph idx="1"/>
           </p:nvPr>
         </p:nvSpPr>
-        <p:spPr/>
-        <p:txBody>
-          <a:bodyPr/>
-          <a:lstStyle/>
-          <a:p>
-            <a:endParaRPr lang="en-CA"/>
+        <p:spPr>
+          <a:xfrm>
+            <a:off x="677334" y="1671892"/>
+            <a:ext cx="8596668" cy="4428988"/>
+          </a:xfrm>
+        </p:spPr>
+        <p:txBody>
+          <a:bodyPr>
+            <a:normAutofit fontScale="62500" lnSpcReduction="20000"/>
+          </a:bodyPr>
+          <a:lstStyle/>
+          <a:p>
+            <a:r>
+              <a:rPr lang="en-CA" dirty="0"/>
+              <a:t>Tom Bermingham, DFO Quebec Region</a:t>
+            </a:r>
+          </a:p>
+          <a:p>
+            <a:r>
+              <a:rPr lang="en-CA" dirty="0"/>
+              <a:t>Mathieu Boudreau, DFO Quebec Region</a:t>
+            </a:r>
+          </a:p>
+          <a:p>
+            <a:r>
+              <a:rPr lang="en-CA" dirty="0"/>
+              <a:t>Michelle Fitzsimmons, DFO NL Region</a:t>
+            </a:r>
+          </a:p>
+          <a:p>
+            <a:r>
+              <a:rPr lang="en-CA" dirty="0"/>
+              <a:t>Kyle Gillespie, DFO Maritimes Region</a:t>
+            </a:r>
+          </a:p>
+          <a:p>
+            <a:r>
+              <a:rPr lang="en-CA" dirty="0"/>
+              <a:t>Wayne </a:t>
+            </a:r>
+            <a:r>
+              <a:rPr lang="en-CA" dirty="0" err="1"/>
+              <a:t>Hajas</a:t>
+            </a:r>
+            <a:r>
+              <a:rPr lang="en-CA" dirty="0"/>
+              <a:t>, DFO Pacific Region</a:t>
+            </a:r>
+          </a:p>
+          <a:p>
+            <a:r>
+              <a:rPr lang="en-CA" dirty="0"/>
+              <a:t>Alex </a:t>
+            </a:r>
+            <a:r>
+              <a:rPr lang="en-CA" dirty="0" err="1"/>
+              <a:t>Hanke</a:t>
+            </a:r>
+            <a:r>
+              <a:rPr lang="en-CA" dirty="0"/>
+              <a:t>, DFO Maritimes Region</a:t>
+            </a:r>
+          </a:p>
+          <a:p>
+            <a:r>
+              <a:rPr lang="en-CA" dirty="0" err="1"/>
+              <a:t>Fatemeh</a:t>
+            </a:r>
+            <a:r>
+              <a:rPr lang="en-CA" dirty="0"/>
+              <a:t> </a:t>
+            </a:r>
+            <a:r>
+              <a:rPr lang="en-CA" dirty="0" err="1"/>
+              <a:t>Hatefi</a:t>
+            </a:r>
+            <a:r>
+              <a:rPr lang="en-CA" dirty="0"/>
+              <a:t>, DFO NL Region</a:t>
+            </a:r>
+          </a:p>
+          <a:p>
+            <a:r>
+              <a:rPr lang="en-CA" dirty="0"/>
+              <a:t>Kevin Hedges, DFO Central and Arctic Region</a:t>
+            </a:r>
+          </a:p>
+          <a:p>
+            <a:r>
+              <a:rPr lang="en-CA" dirty="0" err="1"/>
+              <a:t>Quang</a:t>
+            </a:r>
+            <a:r>
+              <a:rPr lang="en-CA" dirty="0"/>
+              <a:t> Huynh, Blue Matter Science</a:t>
+            </a:r>
+          </a:p>
+          <a:p>
+            <a:r>
+              <a:rPr lang="en-CA" dirty="0"/>
+              <a:t>Rajeev Kumar, DFO NL Region </a:t>
+            </a:r>
+          </a:p>
+          <a:p>
+            <a:r>
+              <a:rPr lang="en-CA" dirty="0"/>
+              <a:t>Marina Milligan, DFO Pacific Region</a:t>
+            </a:r>
+          </a:p>
+          <a:p>
+            <a:r>
+              <a:rPr lang="en-CA" dirty="0"/>
+              <a:t>Shannon </a:t>
+            </a:r>
+            <a:r>
+              <a:rPr lang="en-CA" dirty="0" err="1"/>
+              <a:t>Obradovich</a:t>
+            </a:r>
+            <a:r>
+              <a:rPr lang="en-CA" dirty="0"/>
+              <a:t>, DFO Pacific Region</a:t>
+            </a:r>
+          </a:p>
+          <a:p>
+            <a:r>
+              <a:rPr lang="en-CA" dirty="0"/>
+              <a:t>Paul Regular, DFO NL Region</a:t>
+            </a:r>
+          </a:p>
+          <a:p>
+            <a:r>
+              <a:rPr lang="en-CA" dirty="0"/>
+              <a:t>Daniel Ricard, DFO Gulf </a:t>
+            </a:r>
+            <a:r>
+              <a:rPr lang="en-CA" dirty="0" smtClean="0"/>
+              <a:t>Region (breakout lead)</a:t>
+            </a:r>
+            <a:endParaRPr lang="en-CA" dirty="0"/>
+          </a:p>
+          <a:p>
+            <a:r>
+              <a:rPr lang="en-CA" dirty="0"/>
+              <a:t>Liza </a:t>
+            </a:r>
+            <a:r>
+              <a:rPr lang="en-CA" dirty="0" err="1"/>
+              <a:t>Tsitrin</a:t>
+            </a:r>
+            <a:r>
+              <a:rPr lang="en-CA" dirty="0"/>
+              <a:t>, DFO Maritimes Region</a:t>
+            </a:r>
+          </a:p>
+          <a:p>
+            <a:r>
+              <a:rPr lang="en-CA" dirty="0"/>
+              <a:t>Luke </a:t>
+            </a:r>
+            <a:r>
+              <a:rPr lang="en-CA" dirty="0" err="1"/>
+              <a:t>Warkentin</a:t>
+            </a:r>
+            <a:r>
+              <a:rPr lang="en-CA" dirty="0"/>
+              <a:t>, DFO Pacific Region</a:t>
+            </a:r>
+          </a:p>
+          <a:p>
+            <a:endParaRPr lang="en-CA" dirty="0"/>
           </a:p>
         </p:txBody>
       </p:sp>
@@ -7087,6 +7251,12 @@
 </file>
 
 <file path=customXml/item2.xml><?xml version="1.0" encoding="utf-8"?>
+<p:properties xmlns:p="http://schemas.microsoft.com/office/2006/metadata/properties" xmlns:xsi="http://www.w3.org/2001/XMLSchema-instance" xmlns:pc="http://schemas.microsoft.com/office/infopath/2007/PartnerControls">
+  <documentManagement/>
+</p:properties>
+</file>
+
+<file path=customXml/item3.xml><?xml version="1.0" encoding="utf-8"?>
 <ct:contentTypeSchema xmlns:ct="http://schemas.microsoft.com/office/2006/metadata/contentType" xmlns:ma="http://schemas.microsoft.com/office/2006/metadata/properties/metaAttributes" ct:_="" ma:_="" ma:contentTypeName="Document" ma:contentTypeID="0x010100C97FE0859335DF4E9B41717FA7F58395" ma:contentTypeVersion="4" ma:contentTypeDescription="Create a new document." ma:contentTypeScope="" ma:versionID="b62445c8373ea721629214e1ee5989b7">
   <xsd:schema xmlns:xsd="http://www.w3.org/2001/XMLSchema" xmlns:xs="http://www.w3.org/2001/XMLSchema" xmlns:p="http://schemas.microsoft.com/office/2006/metadata/properties" xmlns:ns2="d767b894-bb0c-4057-8e02-fb845d8dfd38" targetNamespace="http://schemas.microsoft.com/office/2006/metadata/properties" ma:root="true" ma:fieldsID="b17ca48fc702513166f970f47d4b1655" ns2:_="">
     <xsd:import namespace="d767b894-bb0c-4057-8e02-fb845d8dfd38"/>
@@ -7232,12 +7402,6 @@
 </ct:contentTypeSchema>
 </file>
 
-<file path=customXml/item3.xml><?xml version="1.0" encoding="utf-8"?>
-<p:properties xmlns:p="http://schemas.microsoft.com/office/2006/metadata/properties" xmlns:xsi="http://www.w3.org/2001/XMLSchema-instance" xmlns:pc="http://schemas.microsoft.com/office/infopath/2007/PartnerControls">
-  <documentManagement/>
-</p:properties>
-</file>
-
 <file path=customXml/itemProps1.xml><?xml version="1.0" encoding="utf-8"?>
 <ds:datastoreItem xmlns:ds="http://schemas.openxmlformats.org/officeDocument/2006/customXml" ds:itemID="{8001B256-AC24-4987-95E9-79F2B7342F76}">
   <ds:schemaRefs>
@@ -7247,6 +7411,15 @@
 </file>
 
 <file path=customXml/itemProps2.xml><?xml version="1.0" encoding="utf-8"?>
+<ds:datastoreItem xmlns:ds="http://schemas.openxmlformats.org/officeDocument/2006/customXml" ds:itemID="{59236500-A653-4FCC-9C4E-8130D30B81CE}">
+  <ds:schemaRefs>
+    <ds:schemaRef ds:uri="http://schemas.microsoft.com/office/2006/metadata/properties"/>
+    <ds:schemaRef ds:uri="http://schemas.microsoft.com/office/infopath/2007/PartnerControls"/>
+  </ds:schemaRefs>
+</ds:datastoreItem>
+</file>
+
+<file path=customXml/itemProps3.xml><?xml version="1.0" encoding="utf-8"?>
 <ds:datastoreItem xmlns:ds="http://schemas.openxmlformats.org/officeDocument/2006/customXml" ds:itemID="{F88B9090-6D09-4E12-9FC0-F294213DFCCB}">
   <ds:schemaRefs>
     <ds:schemaRef ds:uri="http://schemas.microsoft.com/office/2006/metadata/contentType"/>
@@ -7262,13 +7435,4 @@
     <ds:schemaRef ds:uri="http://schemas.microsoft.com/internal/obd"/>
   </ds:schemaRefs>
 </ds:datastoreItem>
-</file>
-
-<file path=customXml/itemProps3.xml><?xml version="1.0" encoding="utf-8"?>
-<ds:datastoreItem xmlns:ds="http://schemas.openxmlformats.org/officeDocument/2006/customXml" ds:itemID="{59236500-A653-4FCC-9C4E-8130D30B81CE}">
-  <ds:schemaRefs>
-    <ds:schemaRef ds:uri="http://schemas.microsoft.com/office/2006/metadata/properties"/>
-    <ds:schemaRef ds:uri="http://schemas.microsoft.com/office/infopath/2007/PartnerControls"/>
-  </ds:schemaRefs>
-</ds:datastoreItem>
 </file>
</xml_diff>